<commit_message>
Adicionando arquivos do teste
</commit_message>
<xml_diff>
--- a/output/apresentacao_raquel.pptx
+++ b/output/apresentacao_raquel.pptx
@@ -121,24 +121,32 @@
   <pc:docChgLst>
     <pc:chgData name="José Bandeira" userId="bb7f309e94719281" providerId="LiveId" clId="{C72B3F87-C3B2-4BF6-BD6A-1B3452AA5B1A}"/>
     <pc:docChg chg="custSel modSld">
-      <pc:chgData name="José Bandeira" userId="bb7f309e94719281" providerId="LiveId" clId="{C72B3F87-C3B2-4BF6-BD6A-1B3452AA5B1A}" dt="2024-09-26T15:07:23.790" v="40" actId="20577"/>
+      <pc:chgData name="José Bandeira" userId="bb7f309e94719281" providerId="LiveId" clId="{C72B3F87-C3B2-4BF6-BD6A-1B3452AA5B1A}" dt="2024-09-26T16:00:22.016" v="49" actId="20577"/>
       <pc:docMkLst>
         <pc:docMk/>
       </pc:docMkLst>
       <pc:sldChg chg="modSp mod">
-        <pc:chgData name="José Bandeira" userId="bb7f309e94719281" providerId="LiveId" clId="{C72B3F87-C3B2-4BF6-BD6A-1B3452AA5B1A}" dt="2024-09-26T15:07:23.790" v="40" actId="20577"/>
+        <pc:chgData name="José Bandeira" userId="bb7f309e94719281" providerId="LiveId" clId="{C72B3F87-C3B2-4BF6-BD6A-1B3452AA5B1A}" dt="2024-09-26T16:00:22.016" v="49" actId="20577"/>
         <pc:sldMkLst>
           <pc:docMk/>
           <pc:sldMk cId="430442421" sldId="259"/>
         </pc:sldMkLst>
         <pc:graphicFrameChg chg="modGraphic">
-          <ac:chgData name="José Bandeira" userId="bb7f309e94719281" providerId="LiveId" clId="{C72B3F87-C3B2-4BF6-BD6A-1B3452AA5B1A}" dt="2024-09-26T15:07:23.790" v="40" actId="20577"/>
+          <ac:chgData name="José Bandeira" userId="bb7f309e94719281" providerId="LiveId" clId="{C72B3F87-C3B2-4BF6-BD6A-1B3452AA5B1A}" dt="2024-09-26T16:00:22.016" v="49" actId="20577"/>
           <ac:graphicFrameMkLst>
             <pc:docMk/>
             <pc:sldMk cId="430442421" sldId="259"/>
             <ac:graphicFrameMk id="25" creationId="{49BCBD0C-15CA-2B7E-CAB4-6F36A3C3B085}"/>
           </ac:graphicFrameMkLst>
         </pc:graphicFrameChg>
+        <pc:picChg chg="mod">
+          <ac:chgData name="José Bandeira" userId="bb7f309e94719281" providerId="LiveId" clId="{C72B3F87-C3B2-4BF6-BD6A-1B3452AA5B1A}" dt="2024-09-26T16:00:13.127" v="42" actId="1038"/>
+          <ac:picMkLst>
+            <pc:docMk/>
+            <pc:sldMk cId="430442421" sldId="259"/>
+            <ac:picMk id="27" creationId="{3CB33356-70E3-F7F1-B253-950A9D33B3F5}"/>
+          </ac:picMkLst>
+        </pc:picChg>
       </pc:sldChg>
     </pc:docChg>
   </pc:docChgLst>
@@ -11073,7 +11081,7 @@
           <p:nvPr>
             <p:extLst>
               <p:ext uri="{D42A27DB-BD31-4B8C-83A1-F6EECF244321}">
-                <p14:modId xmlns:p14="http://schemas.microsoft.com/office/powerpoint/2010/main" val="2557596079"/>
+                <p14:modId xmlns:p14="http://schemas.microsoft.com/office/powerpoint/2010/main" val="1194594209"/>
               </p:ext>
             </p:extLst>
           </p:nvPr>
@@ -11269,7 +11277,7 @@
                           <a:latin typeface="Arial" panose="020B0604020202020204" pitchFamily="34" charset="0"/>
                           <a:cs typeface="Arial" panose="020B0604020202020204" pitchFamily="34" charset="0"/>
                         </a:rPr>
-                        <a:t>Sequenciamento</a:t>
+                        <a:t>amostra</a:t>
                       </a:r>
                       <a:endParaRPr lang="en-US" sz="1600" b="1" i="0" u="none" strike="noStrike" dirty="0">
                         <a:solidFill>
@@ -12594,7 +12602,7 @@
         </p:blipFill>
         <p:spPr>
           <a:xfrm>
-            <a:off x="9309098" y="5056519"/>
+            <a:off x="9323846" y="5041771"/>
             <a:ext cx="1130300" cy="218053"/>
           </a:xfrm>
           <a:prstGeom prst="rect">

</xml_diff>